<commit_message>
Add 2019 recordings, and v2 of pptx
</commit_message>
<xml_diff>
--- a/2019_clean_coding_plsql_sql/Clean Coding in PLSQL and SQL.pptx
+++ b/2019_clean_coding_plsql_sql/Clean Coding in PLSQL and SQL.pptx
@@ -342,7 +342,7 @@
           <a:p>
             <a:fld id="{ED0391C6-4056-4F5F-BEDC-2C917ACFECF9}" type="datetimeFigureOut">
               <a:rPr lang="en-IE" smtClean="0"/>
-              <a:t>04/04/2019</a:t>
+              <a:t>14/01/2020</a:t>
             </a:fld>
             <a:endParaRPr lang="en-IE"/>
           </a:p>
@@ -519,7 +519,7 @@
           <a:p>
             <a:fld id="{B1991688-4325-40A2-BBF0-5853202C799D}" type="datetimeFigureOut">
               <a:rPr lang="en-IE" smtClean="0"/>
-              <a:t>04/04/2019</a:t>
+              <a:t>14/01/2020</a:t>
             </a:fld>
             <a:endParaRPr lang="en-IE"/>
           </a:p>
@@ -10494,8 +10494,8 @@
         </p:nvSpPr>
         <p:spPr>
           <a:xfrm>
-            <a:off x="628636" y="5017295"/>
-            <a:ext cx="7886700" cy="1148007"/>
+            <a:off x="628636" y="4959483"/>
+            <a:ext cx="7886700" cy="1428083"/>
           </a:xfrm>
           <a:prstGeom prst="rect">
             <a:avLst/>
@@ -10579,7 +10579,26 @@
             </a:pPr>
             <a:r>
               <a:rPr lang="en-US" sz="1400" dirty="0"/>
-              <a:t>Suggests that nesting subprograms and blocks should be exceptional</a:t>
+              <a:t>Suggests that nesting subprograms and blocks should be exceptional…</a:t>
+            </a:r>
+          </a:p>
+          <a:p>
+            <a:pPr marL="657225" lvl="1" indent="-200025" eaLnBrk="0" fontAlgn="base" hangingPunct="0">
+              <a:spcBef>
+                <a:spcPct val="0"/>
+              </a:spcBef>
+              <a:spcAft>
+                <a:spcPct val="30000"/>
+              </a:spcAft>
+              <a:buClr>
+                <a:srgbClr val="5D9A0C"/>
+              </a:buClr>
+              <a:buFont typeface="Wingdings 3" pitchFamily="18" charset="2"/>
+              <a:buChar char=""/>
+            </a:pPr>
+            <a:r>
+              <a:rPr lang="en-US" sz="1400" dirty="0"/>
+              <a:t>Or, care must be taken to avoid negative impacts on information hiding</a:t>
             </a:r>
           </a:p>
         </p:txBody>
@@ -11584,7 +11603,7 @@
             </a:pPr>
             <a:r>
               <a:rPr lang="en-US" sz="1400" dirty="0"/>
-              <a:t>Subprogram structure generally flat, i.e. not nested</a:t>
+              <a:t>Minimize shared access to variables</a:t>
             </a:r>
           </a:p>
         </p:txBody>
@@ -20812,7 +20831,7 @@
           <a:graphicData uri="http://schemas.openxmlformats.org/presentationml/2006/ole">
             <mc:AlternateContent xmlns:mc="http://schemas.openxmlformats.org/markup-compatibility/2006">
               <mc:Choice xmlns:v="urn:schemas-microsoft-com:vml" Requires="v">
-                <p:oleObj spid="_x0000_s1083" name="Packager Shell Object" showAsIcon="1" r:id="rId5" imgW="1297440" imgH="439560" progId="Package">
+                <p:oleObj spid="_x0000_s1090" name="Packager Shell Object" showAsIcon="1" r:id="rId5" imgW="1297440" imgH="439560" progId="Package">
                   <p:embed/>
                 </p:oleObj>
               </mc:Choice>
@@ -21213,7 +21232,7 @@
           <a:graphicData uri="http://schemas.openxmlformats.org/presentationml/2006/ole">
             <mc:AlternateContent xmlns:mc="http://schemas.openxmlformats.org/markup-compatibility/2006">
               <mc:Choice xmlns:v="urn:schemas-microsoft-com:vml" Requires="v">
-                <p:oleObj spid="_x0000_s2098" name="Packager Shell Object" showAsIcon="1" r:id="rId5" imgW="1297440" imgH="439560" progId="Package">
+                <p:oleObj spid="_x0000_s2105" name="Packager Shell Object" showAsIcon="1" r:id="rId5" imgW="1297440" imgH="439560" progId="Package">
                   <p:embed/>
                 </p:oleObj>
               </mc:Choice>
@@ -24880,7 +24899,7 @@
           </a:bodyPr>
           <a:lstStyle/>
           <a:p>
-            <a:pPr marL="200025" indent="-200025" eaLnBrk="0" fontAlgn="base" hangingPunct="0">
+            <a:pPr eaLnBrk="0" fontAlgn="base" hangingPunct="0">
               <a:spcBef>
                 <a:spcPct val="0"/>
               </a:spcBef>
@@ -24890,8 +24909,6 @@
               <a:buClr>
                 <a:srgbClr val="5D9A0C"/>
               </a:buClr>
-              <a:buFont typeface="Wingdings 3" pitchFamily="18" charset="2"/>
-              <a:buChar char=""/>
             </a:pPr>
             <a:r>
               <a:rPr lang="en-US" sz="1400" b="1" u="sng" dirty="0"/>
@@ -24984,7 +25001,7 @@
           </a:bodyPr>
           <a:lstStyle/>
           <a:p>
-            <a:pPr marL="200025" indent="-200025" eaLnBrk="0" fontAlgn="base" hangingPunct="0">
+            <a:pPr eaLnBrk="0" fontAlgn="base" hangingPunct="0">
               <a:spcBef>
                 <a:spcPct val="0"/>
               </a:spcBef>
@@ -24994,8 +25011,6 @@
               <a:buClr>
                 <a:srgbClr val="5D9A0C"/>
               </a:buClr>
-              <a:buFont typeface="Wingdings 3" pitchFamily="18" charset="2"/>
-              <a:buChar char=""/>
             </a:pPr>
             <a:r>
               <a:rPr lang="en-US" sz="1400" b="1" u="sng" dirty="0"/>
@@ -29272,7 +29287,7 @@
         <p:spPr>
           <a:xfrm>
             <a:off x="628649" y="2049133"/>
-            <a:ext cx="7886700" cy="3948773"/>
+            <a:ext cx="7886700" cy="4228850"/>
           </a:xfrm>
           <a:prstGeom prst="rect">
             <a:avLst/>
@@ -29346,7 +29361,29 @@
             </a:pPr>
             <a:r>
               <a:rPr lang="en-US" sz="1400" dirty="0"/>
-              <a:t>Avoid package state, except where necessary, and use a flat, non-nested subprogram structure</a:t>
+              <a:t>Avoid package state, except where necessary</a:t>
+            </a:r>
+          </a:p>
+          <a:p>
+            <a:pPr marL="200025" indent="-200025" eaLnBrk="0" fontAlgn="base" hangingPunct="0">
+              <a:lnSpc>
+                <a:spcPct val="100000"/>
+              </a:lnSpc>
+              <a:spcBef>
+                <a:spcPct val="0"/>
+              </a:spcBef>
+              <a:spcAft>
+                <a:spcPct val="30000"/>
+              </a:spcAft>
+              <a:buClr>
+                <a:srgbClr val="5D9A0C"/>
+              </a:buClr>
+              <a:buFont typeface="Wingdings 3" pitchFamily="18" charset="2"/>
+              <a:buChar char=""/>
+            </a:pPr>
+            <a:r>
+              <a:rPr lang="en-US" sz="1400" dirty="0"/>
+              <a:t>Use nesting of blocks with care, avoiding unnecessary sharing of variable access</a:t>
             </a:r>
           </a:p>
           <a:p>

</xml_diff>